<commit_message>
ajout styles compte rendu
</commit_message>
<xml_diff>
--- a/soutenance/Soutenance.pptx
+++ b/soutenance/Soutenance.pptx
@@ -134,7 +134,7 @@
 <file path=ppt/revisionInfo.xml><?xml version="1.0" encoding="utf-8"?>
 <p1510:revInfo xmlns:a="http://schemas.openxmlformats.org/drawingml/2006/main" xmlns:r="http://schemas.openxmlformats.org/officeDocument/2006/relationships" xmlns:p1510="http://schemas.microsoft.com/office/powerpoint/2015/10/main">
   <p1510:revLst>
-    <p1510:client id="{79071E21-E6A7-4192-B912-4FE7192CC8A6}" v="205" dt="2019-10-17T13:21:56.249"/>
+    <p1510:client id="{79071E21-E6A7-4192-B912-4FE7192CC8A6}" v="499" dt="2019-10-20T12:20:37.929"/>
   </p1510:revLst>
 </p1510:revInfo>
 </file>
@@ -144,12 +144,12 @@
   <pc:docChgLst>
     <pc:chgData name="Quentin Avrain" userId="8bc872cf632c555a" providerId="LiveId" clId="{79071E21-E6A7-4192-B912-4FE7192CC8A6}"/>
     <pc:docChg chg="undo custSel addSld modSld sldOrd modMainMaster">
-      <pc:chgData name="Quentin Avrain" userId="8bc872cf632c555a" providerId="LiveId" clId="{79071E21-E6A7-4192-B912-4FE7192CC8A6}" dt="2019-10-17T13:21:58.554" v="777" actId="478"/>
+      <pc:chgData name="Quentin Avrain" userId="8bc872cf632c555a" providerId="LiveId" clId="{79071E21-E6A7-4192-B912-4FE7192CC8A6}" dt="2019-10-20T12:20:37.929" v="1079"/>
       <pc:docMkLst>
         <pc:docMk/>
       </pc:docMkLst>
-      <pc:sldChg chg="addSp modSp modAnim">
-        <pc:chgData name="Quentin Avrain" userId="8bc872cf632c555a" providerId="LiveId" clId="{79071E21-E6A7-4192-B912-4FE7192CC8A6}" dt="2019-10-17T12:58:17.861" v="583"/>
+      <pc:sldChg chg="addSp modSp modTransition modAnim">
+        <pc:chgData name="Quentin Avrain" userId="8bc872cf632c555a" providerId="LiveId" clId="{79071E21-E6A7-4192-B912-4FE7192CC8A6}" dt="2019-10-20T12:18:38.630" v="1068"/>
         <pc:sldMkLst>
           <pc:docMk/>
           <pc:sldMk cId="2168469693" sldId="256"/>
@@ -399,7 +399,7 @@
         </pc:graphicFrameChg>
       </pc:sldChg>
       <pc:sldChg chg="addSp delSp modSp modAnim">
-        <pc:chgData name="Quentin Avrain" userId="8bc872cf632c555a" providerId="LiveId" clId="{79071E21-E6A7-4192-B912-4FE7192CC8A6}" dt="2019-10-17T12:59:24.578" v="605"/>
+        <pc:chgData name="Quentin Avrain" userId="8bc872cf632c555a" providerId="LiveId" clId="{79071E21-E6A7-4192-B912-4FE7192CC8A6}" dt="2019-10-20T12:20:37.929" v="1079"/>
         <pc:sldMkLst>
           <pc:docMk/>
           <pc:sldMk cId="2833213299" sldId="269"/>
@@ -4422,7 +4422,7 @@
           <a:p>
             <a:fld id="{9498DD42-5454-4B4C-9868-0F62FA7AD7A7}" type="datetimeFigureOut">
               <a:rPr lang="fr-FR" smtClean="0"/>
-              <a:t>18/10/2019</a:t>
+              <a:t>20/10/2019</a:t>
             </a:fld>
             <a:endParaRPr lang="fr-FR"/>
           </a:p>
@@ -4587,7 +4587,7 @@
           <a:p>
             <a:fld id="{8DFDF153-09B3-4609-96C4-1E4290C745BE}" type="datetimeFigureOut">
               <a:rPr lang="fr-FR" smtClean="0"/>
-              <a:t>18/10/2019</a:t>
+              <a:t>20/10/2019</a:t>
             </a:fld>
             <a:endParaRPr lang="fr-FR"/>
           </a:p>
@@ -11045,13 +11045,13 @@
   <p:clrMapOvr>
     <a:masterClrMapping/>
   </p:clrMapOvr>
-  <mc:AlternateContent xmlns:mc="http://schemas.openxmlformats.org/markup-compatibility/2006" xmlns:p14="http://schemas.microsoft.com/office/powerpoint/2010/main">
-    <mc:Choice Requires="p14">
-      <p:transition spd="slow">
-        <p14:prism isContent="1"/>
+  <mc:AlternateContent xmlns:mc="http://schemas.openxmlformats.org/markup-compatibility/2006">
+    <mc:Choice xmlns:p14="http://schemas.microsoft.com/office/powerpoint/2010/main" Requires="p14">
+      <p:transition spd="slow" p14:dur="10000">
+        <p14:glitter pattern="hexagon"/>
       </p:transition>
     </mc:Choice>
-    <mc:Fallback xmlns="">
+    <mc:Fallback>
       <p:transition spd="slow">
         <p:fade/>
       </p:transition>

</xml_diff>